<commit_message>
add qr code to slides
</commit_message>
<xml_diff>
--- a/job/teaching/teaching-demonstration2.pptx
+++ b/job/teaching/teaching-demonstration2.pptx
@@ -143,7 +143,7 @@
 <file path=ppt/revisionInfo.xml><?xml version="1.0" encoding="utf-8"?>
 <p1510:revInfo xmlns:a="http://schemas.openxmlformats.org/drawingml/2006/main" xmlns:r="http://schemas.openxmlformats.org/officeDocument/2006/relationships" xmlns:p1510="http://schemas.microsoft.com/office/powerpoint/2015/10/main">
   <p1510:revLst>
-    <p1510:client id="{A77833D6-49E4-4E9A-90FC-827386025560}" v="362" dt="2022-11-18T17:55:18.556"/>
+    <p1510:client id="{A77833D6-49E4-4E9A-90FC-827386025560}" v="364" dt="2022-11-18T18:29:31.793"/>
   </p1510:revLst>
 </p1510:revInfo>
 </file>
@@ -153,16 +153,32 @@
   <pc:docChgLst>
     <pc:chgData name="Alison Kleffner" userId="0bed3509-e787-48f4-9a13-47afcd2529d5" providerId="ADAL" clId="{A77833D6-49E4-4E9A-90FC-827386025560}"/>
     <pc:docChg chg="undo custSel addSld delSld modSld sldOrd">
-      <pc:chgData name="Alison Kleffner" userId="0bed3509-e787-48f4-9a13-47afcd2529d5" providerId="ADAL" clId="{A77833D6-49E4-4E9A-90FC-827386025560}" dt="2022-11-18T17:55:18.556" v="2447"/>
+      <pc:chgData name="Alison Kleffner" userId="0bed3509-e787-48f4-9a13-47afcd2529d5" providerId="ADAL" clId="{A77833D6-49E4-4E9A-90FC-827386025560}" dt="2022-11-18T18:29:33.608" v="2476" actId="1076"/>
       <pc:docMkLst>
         <pc:docMk/>
       </pc:docMkLst>
-      <pc:sldChg chg="delSp mod">
-        <pc:chgData name="Alison Kleffner" userId="0bed3509-e787-48f4-9a13-47afcd2529d5" providerId="ADAL" clId="{A77833D6-49E4-4E9A-90FC-827386025560}" dt="2022-11-17T19:28:59.115" v="1785" actId="478"/>
+      <pc:sldChg chg="addSp delSp modSp mod">
+        <pc:chgData name="Alison Kleffner" userId="0bed3509-e787-48f4-9a13-47afcd2529d5" providerId="ADAL" clId="{A77833D6-49E4-4E9A-90FC-827386025560}" dt="2022-11-18T18:29:33.608" v="2476" actId="1076"/>
         <pc:sldMkLst>
           <pc:docMk/>
           <pc:sldMk cId="1659551543" sldId="256"/>
         </pc:sldMkLst>
+        <pc:spChg chg="mod">
+          <ac:chgData name="Alison Kleffner" userId="0bed3509-e787-48f4-9a13-47afcd2529d5" providerId="ADAL" clId="{A77833D6-49E4-4E9A-90FC-827386025560}" dt="2022-11-18T18:26:01.360" v="2448" actId="14100"/>
+          <ac:spMkLst>
+            <pc:docMk/>
+            <pc:sldMk cId="1659551543" sldId="256"/>
+            <ac:spMk id="2" creationId="{E04B76E4-144C-0147-27CA-B9EAD72ADF55}"/>
+          </ac:spMkLst>
+        </pc:spChg>
+        <pc:spChg chg="add mod">
+          <ac:chgData name="Alison Kleffner" userId="0bed3509-e787-48f4-9a13-47afcd2529d5" providerId="ADAL" clId="{A77833D6-49E4-4E9A-90FC-827386025560}" dt="2022-11-18T18:26:19.903" v="2472" actId="255"/>
+          <ac:spMkLst>
+            <pc:docMk/>
+            <pc:sldMk cId="1659551543" sldId="256"/>
+            <ac:spMk id="3" creationId="{1702C28D-7741-3BDC-D3A0-7983590D2FFB}"/>
+          </ac:spMkLst>
+        </pc:spChg>
         <pc:spChg chg="del">
           <ac:chgData name="Alison Kleffner" userId="0bed3509-e787-48f4-9a13-47afcd2529d5" providerId="ADAL" clId="{A77833D6-49E4-4E9A-90FC-827386025560}" dt="2022-11-17T19:28:59.115" v="1785" actId="478"/>
           <ac:spMkLst>
@@ -171,6 +187,14 @@
             <ac:spMk id="3" creationId="{1A9B5663-F249-D70E-C51B-857BFFEB808D}"/>
           </ac:spMkLst>
         </pc:spChg>
+        <pc:picChg chg="add mod">
+          <ac:chgData name="Alison Kleffner" userId="0bed3509-e787-48f4-9a13-47afcd2529d5" providerId="ADAL" clId="{A77833D6-49E4-4E9A-90FC-827386025560}" dt="2022-11-18T18:29:33.608" v="2476" actId="1076"/>
+          <ac:picMkLst>
+            <pc:docMk/>
+            <pc:sldMk cId="1659551543" sldId="256"/>
+            <ac:picMk id="5" creationId="{472EF002-1C01-8294-795E-26C64F0F5127}"/>
+          </ac:picMkLst>
+        </pc:picChg>
       </pc:sldChg>
       <pc:sldChg chg="delSp modSp mod">
         <pc:chgData name="Alison Kleffner" userId="0bed3509-e787-48f4-9a13-47afcd2529d5" providerId="ADAL" clId="{A77833D6-49E4-4E9A-90FC-827386025560}" dt="2022-11-18T16:40:46.163" v="2344" actId="20577"/>
@@ -5192,7 +5216,12 @@
             <p:ph type="ctrTitle"/>
           </p:nvPr>
         </p:nvSpPr>
-        <p:spPr/>
+        <p:spPr>
+          <a:xfrm>
+            <a:off x="1097280" y="758952"/>
+            <a:ext cx="10058400" cy="3298143"/>
+          </a:xfrm>
+        </p:spPr>
         <p:txBody>
           <a:bodyPr/>
           <a:lstStyle/>
@@ -5204,6 +5233,77 @@
           </a:p>
         </p:txBody>
       </p:sp>
+      <p:sp>
+        <p:nvSpPr>
+          <p:cNvPr id="3" name="TextBox 2">
+            <a:extLst>
+              <a:ext uri="{FF2B5EF4-FFF2-40B4-BE49-F238E27FC236}">
+                <a16:creationId xmlns:a16="http://schemas.microsoft.com/office/drawing/2014/main" id="{1702C28D-7741-3BDC-D3A0-7983590D2FFB}"/>
+              </a:ext>
+            </a:extLst>
+          </p:cNvPr>
+          <p:cNvSpPr txBox="1"/>
+          <p:nvPr/>
+        </p:nvSpPr>
+        <p:spPr>
+          <a:xfrm>
+            <a:off x="1097280" y="4572000"/>
+            <a:ext cx="6729274" cy="461665"/>
+          </a:xfrm>
+          <a:prstGeom prst="rect">
+            <a:avLst/>
+          </a:prstGeom>
+          <a:noFill/>
+        </p:spPr>
+        <p:txBody>
+          <a:bodyPr wrap="square" rtlCol="0">
+            <a:spAutoFit/>
+          </a:bodyPr>
+          <a:lstStyle/>
+          <a:p>
+            <a:r>
+              <a:rPr lang="en-US" sz="2400" dirty="0"/>
+              <a:t>Alison Kleffner</a:t>
+            </a:r>
+          </a:p>
+        </p:txBody>
+      </p:sp>
+      <p:pic>
+        <p:nvPicPr>
+          <p:cNvPr id="5" name="Picture 4" descr="Qr code&#10;&#10;Description automatically generated">
+            <a:extLst>
+              <a:ext uri="{FF2B5EF4-FFF2-40B4-BE49-F238E27FC236}">
+                <a16:creationId xmlns:a16="http://schemas.microsoft.com/office/drawing/2014/main" id="{472EF002-1C01-8294-795E-26C64F0F5127}"/>
+              </a:ext>
+            </a:extLst>
+          </p:cNvPr>
+          <p:cNvPicPr>
+            <a:picLocks noChangeAspect="1"/>
+          </p:cNvPicPr>
+          <p:nvPr/>
+        </p:nvPicPr>
+        <p:blipFill>
+          <a:blip r:embed="rId2">
+            <a:extLst>
+              <a:ext uri="{28A0092B-C50C-407E-A947-70E740481C1C}">
+                <a14:useLocalDpi xmlns:a14="http://schemas.microsoft.com/office/drawing/2010/main" val="0"/>
+              </a:ext>
+            </a:extLst>
+          </a:blip>
+          <a:stretch>
+            <a:fillRect/>
+          </a:stretch>
+        </p:blipFill>
+        <p:spPr>
+          <a:xfrm>
+            <a:off x="8894350" y="359426"/>
+            <a:ext cx="2606266" cy="2636748"/>
+          </a:xfrm>
+          <a:prstGeom prst="rect">
+            <a:avLst/>
+          </a:prstGeom>
+        </p:spPr>
+      </p:pic>
     </p:spTree>
     <p:extLst>
       <p:ext uri="{BB962C8B-B14F-4D97-AF65-F5344CB8AC3E}">
@@ -13879,8 +13979,8 @@
           </a:p>
         </p:txBody>
       </p:sp>
-      <mc:AlternateContent xmlns:mc="http://schemas.openxmlformats.org/markup-compatibility/2006">
-        <mc:Choice xmlns:a14="http://schemas.microsoft.com/office/drawing/2010/main" Requires="a14">
+      <mc:AlternateContent xmlns:mc="http://schemas.openxmlformats.org/markup-compatibility/2006" xmlns:a14="http://schemas.microsoft.com/office/drawing/2010/main">
+        <mc:Choice Requires="a14">
           <p:sp>
             <p:nvSpPr>
               <p:cNvPr id="5" name="Text Placeholder 4">
@@ -14012,7 +14112,7 @@
             </p:txBody>
           </p:sp>
         </mc:Choice>
-        <mc:Fallback>
+        <mc:Fallback xmlns="">
           <p:sp>
             <p:nvSpPr>
               <p:cNvPr id="5" name="Text Placeholder 4">

</xml_diff>